<commit_message>
code update and prop file
</commit_message>
<xml_diff>
--- a/Concept Road Map V10.7.5.pptx
+++ b/Concept Road Map V10.7.5.pptx
@@ -217,7 +217,7 @@
           <a:p>
             <a:fld id="{D3769A77-DD9C-4447-B03C-35EBD87A79FD}" type="datetimeFigureOut">
               <a:rPr lang="en-US" smtClean="0"/>
-              <a:t>4/4/2025</a:t>
+              <a:t>4/16/2025</a:t>
             </a:fld>
             <a:endParaRPr lang="en-US"/>
           </a:p>
@@ -1617,7 +1617,7 @@
           <a:p>
             <a:fld id="{49CFB85E-BC82-4E92-9523-918AE5386414}" type="datetimeFigureOut">
               <a:rPr lang="en-US" smtClean="0"/>
-              <a:t>4/4/2025</a:t>
+              <a:t>4/16/2025</a:t>
             </a:fld>
             <a:endParaRPr lang="en-US"/>
           </a:p>
@@ -2218,7 +2218,7 @@
           <a:p>
             <a:fld id="{AE3E3D89-E4D0-404D-BD0D-A2334537F141}" type="datetimeFigureOut">
               <a:rPr lang="en-US" smtClean="0"/>
-              <a:t>4/4/2025</a:t>
+              <a:t>4/16/2025</a:t>
             </a:fld>
             <a:endParaRPr lang="en-US"/>
           </a:p>
@@ -2506,7 +2506,7 @@
           <a:p>
             <a:fld id="{AE3E3D89-E4D0-404D-BD0D-A2334537F141}" type="datetimeFigureOut">
               <a:rPr lang="en-US" smtClean="0"/>
-              <a:t>4/4/2025</a:t>
+              <a:t>4/16/2025</a:t>
             </a:fld>
             <a:endParaRPr lang="en-US"/>
           </a:p>
@@ -2776,7 +2776,7 @@
           <a:p>
             <a:fld id="{AE3E3D89-E4D0-404D-BD0D-A2334537F141}" type="datetimeFigureOut">
               <a:rPr lang="en-US" smtClean="0"/>
-              <a:t>4/4/2025</a:t>
+              <a:t>4/16/2025</a:t>
             </a:fld>
             <a:endParaRPr lang="en-US"/>
           </a:p>
@@ -3208,7 +3208,7 @@
           <a:p>
             <a:fld id="{49CFB85E-BC82-4E92-9523-918AE5386414}" type="datetimeFigureOut">
               <a:rPr lang="en-US" smtClean="0"/>
-              <a:t>4/4/2025</a:t>
+              <a:t>4/16/2025</a:t>
             </a:fld>
             <a:endParaRPr lang="en-US"/>
           </a:p>
@@ -8565,7 +8565,7 @@
             </a:r>
             <a:r>
               <a:rPr lang="en-US" sz="2800" i="1" dirty="0"/>
-              <a:t>Staff</a:t>
+              <a:t>Politics</a:t>
             </a:r>
             <a:r>
               <a:rPr lang="en-US" sz="2800" dirty="0"/>
@@ -8925,7 +8925,7 @@
           <a:p>
             <a:r>
               <a:rPr lang="en-US" dirty="0"/>
-              <a:t>RAT's, ADG's and Li-ion Battery Systems</a:t>
+              <a:t>RAT's, ADG's and Lithium Battery Systems</a:t>
             </a:r>
           </a:p>
           <a:p>

</xml_diff>